<commit_message>
Finished Senior Design Cycle 2 Report
</commit_message>
<xml_diff>
--- a/Cycle2DOC/CycleTwoPresentation.pptx
+++ b/Cycle2DOC/CycleTwoPresentation.pptx
@@ -3792,10 +3792,24 @@
           <a:bodyPr/>
           <a:lstStyle/>
           <a:p>
-            <a:pPr lvl="1"/>
+            <a:pPr marL="457200" lvl="1" indent="0">
+              <a:buNone/>
+            </a:pPr>
             <a:r>
               <a:rPr lang="en-US" dirty="0"/>
-              <a:t>implement/test/review </a:t>
+              <a:t>I</a:t>
+            </a:r>
+            <a:r>
+              <a:rPr lang="en-US" dirty="0" smtClean="0"/>
+              <a:t>mplement/</a:t>
+            </a:r>
+            <a:r>
+              <a:rPr lang="en-US" dirty="0" smtClean="0"/>
+              <a:t>Te</a:t>
+            </a:r>
+            <a:r>
+              <a:rPr lang="en-US" dirty="0" smtClean="0"/>
+              <a:t>st/Review </a:t>
             </a:r>
             <a:r>
               <a:rPr lang="en-US" dirty="0" smtClean="0"/>
@@ -3910,24 +3924,38 @@
           <a:lstStyle/>
           <a:p>
             <a:r>
-              <a:rPr lang="en-US" dirty="0" smtClean="0"/>
-              <a:t>Maybe not a lesson, but we learned new programming techniques/languages</a:t>
+              <a:rPr lang="en-US" dirty="0" err="1" smtClean="0"/>
+              <a:t>Php</a:t>
+            </a:r>
+            <a:r>
+              <a:rPr lang="en-US" dirty="0" smtClean="0"/>
+              <a:t> implementation techniques</a:t>
+            </a:r>
+          </a:p>
+          <a:p>
+            <a:r>
+              <a:rPr lang="en-US" dirty="0" smtClean="0"/>
+              <a:t>Stick to the original cycle plan.</a:t>
             </a:r>
           </a:p>
           <a:p>
             <a:pPr lvl="1"/>
             <a:r>
               <a:rPr lang="en-US" dirty="0" smtClean="0"/>
-              <a:t>A lot of </a:t>
-            </a:r>
-            <a:r>
-              <a:rPr lang="en-US" dirty="0" err="1" smtClean="0"/>
-              <a:t>php</a:t>
-            </a:r>
-            <a:r>
-              <a:rPr lang="en-US" dirty="0" smtClean="0"/>
-              <a:t> was needed for the backend and we all contributed</a:t>
-            </a:r>
+              <a:t>If our cycle </a:t>
+            </a:r>
+            <a:r>
+              <a:rPr lang="en-US" smtClean="0"/>
+              <a:t>plan changes</a:t>
+            </a:r>
+            <a:r>
+              <a:rPr lang="en-US" smtClean="0"/>
+              <a:t> document it</a:t>
+            </a:r>
+            <a:endParaRPr lang="en-US" dirty="0" smtClean="0"/>
+          </a:p>
+          <a:p>
+            <a:endParaRPr lang="en-US" dirty="0" smtClean="0"/>
           </a:p>
         </p:txBody>
       </p:sp>
@@ -4169,12 +4197,8 @@
           </a:p>
           <a:p>
             <a:r>
-              <a:rPr lang="en-US" smtClean="0"/>
-              <a:t>Additional </a:t>
-            </a:r>
-            <a:r>
-              <a:rPr lang="en-US" dirty="0" smtClean="0"/>
-              <a:t>Form Features</a:t>
+              <a:rPr lang="en-US" dirty="0" smtClean="0"/>
+              <a:t>Additional Form Features</a:t>
             </a:r>
           </a:p>
           <a:p>
@@ -4621,7 +4645,7 @@
                 <a:ea typeface="Arial"/>
                 <a:cs typeface="Arial"/>
               </a:rPr>
-              <a:t>In progress</a:t>
+              <a:t>done</a:t>
             </a:r>
             <a:endParaRPr lang="en-US" dirty="0"/>
           </a:p>
@@ -4768,7 +4792,15 @@
           <a:p>
             <a:r>
               <a:rPr lang="en-US" dirty="0" smtClean="0"/>
-              <a:t>Cycle 1 Progress</a:t>
+              <a:t>Cycle </a:t>
+            </a:r>
+            <a:r>
+              <a:rPr lang="en-US" dirty="0" smtClean="0"/>
+              <a:t>2 </a:t>
+            </a:r>
+            <a:r>
+              <a:rPr lang="en-US" dirty="0" smtClean="0"/>
+              <a:t>Progress</a:t>
             </a:r>
             <a:endParaRPr lang="en-US" dirty="0"/>
           </a:p>
@@ -4838,7 +4870,22 @@
             <a:pPr lvl="1"/>
             <a:r>
               <a:rPr lang="en-US" dirty="0" smtClean="0"/>
-              <a:t>completed</a:t>
+              <a:t>Completed</a:t>
+            </a:r>
+            <a:endParaRPr lang="en-US" dirty="0" smtClean="0"/>
+          </a:p>
+          <a:p>
+            <a:r>
+              <a:rPr lang="en-US" dirty="0" smtClean="0"/>
+              <a:t>Create New Reservations</a:t>
+            </a:r>
+            <a:endParaRPr lang="en-US" dirty="0" smtClean="0"/>
+          </a:p>
+          <a:p>
+            <a:pPr lvl="1"/>
+            <a:r>
+              <a:rPr lang="en-US" dirty="0" smtClean="0"/>
+              <a:t>Completed</a:t>
             </a:r>
             <a:endParaRPr lang="en-US" dirty="0"/>
           </a:p>
@@ -4915,7 +4962,9 @@
         </p:nvSpPr>
         <p:spPr/>
         <p:txBody>
-          <a:bodyPr/>
+          <a:bodyPr>
+            <a:normAutofit/>
+          </a:bodyPr>
           <a:lstStyle/>
           <a:p>
             <a:r>
@@ -4926,18 +4975,20 @@
               <a:rPr lang="en-US" dirty="0" smtClean="0"/>
               <a:t>Communication</a:t>
             </a:r>
+            <a:endParaRPr lang="en-US" dirty="0"/>
+          </a:p>
+          <a:p>
+            <a:r>
+              <a:rPr lang="en-US" dirty="0" smtClean="0"/>
+              <a:t>Sporadic  communication leads to sporadic design changes.</a:t>
+            </a:r>
           </a:p>
           <a:p>
             <a:pPr lvl="1"/>
             <a:r>
               <a:rPr lang="en-US" dirty="0" smtClean="0"/>
-              <a:t>We are open to </a:t>
-            </a:r>
-            <a:r>
-              <a:rPr lang="en-US" smtClean="0"/>
-              <a:t>any advice</a:t>
-            </a:r>
-            <a:endParaRPr lang="en-US" dirty="0" smtClean="0"/>
+              <a:t>This unfortunately changes our cycle focus</a:t>
+            </a:r>
           </a:p>
           <a:p>
             <a:r>
@@ -5023,7 +5074,7 @@
           <a:p>
             <a:r>
               <a:rPr lang="en-US" dirty="0" smtClean="0"/>
-              <a:t>Design Description:</a:t>
+              <a:t>Reservation Form</a:t>
             </a:r>
             <a:endParaRPr lang="en-US" dirty="0"/>
           </a:p>
@@ -5141,9 +5192,10 @@
           <a:lstStyle/>
           <a:p>
             <a:r>
-              <a:rPr lang="en-US" dirty="0"/>
-              <a:t>Design Description:</a:t>
-            </a:r>
+              <a:rPr lang="en-US" dirty="0" smtClean="0"/>
+              <a:t>Reservation Form</a:t>
+            </a:r>
+            <a:endParaRPr lang="en-US" dirty="0"/>
           </a:p>
         </p:txBody>
       </p:sp>
@@ -5171,15 +5223,7 @@
             </a:r>
             <a:r>
               <a:rPr lang="en-US" dirty="0" smtClean="0"/>
-              <a:t>Insertion Form Button </a:t>
-            </a:r>
-            <a:r>
-              <a:rPr lang="en-US" dirty="0" err="1" smtClean="0"/>
-              <a:t>Fuctionality</a:t>
-            </a:r>
-            <a:r>
-              <a:rPr lang="en-US" dirty="0" smtClean="0"/>
-              <a:t>:</a:t>
+              <a:t>Insertion Form Button Functionality:</a:t>
             </a:r>
           </a:p>
           <a:p>

</xml_diff>